<commit_message>
Add the OPM link to the PPT.
</commit_message>
<xml_diff>
--- a/FE-dev-0.0.1.pptx
+++ b/FE-dev-0.0.1.pptx
@@ -4700,11 +4700,7 @@
             </a:r>
             <a:r>
               <a:rPr lang="en-US" altLang="zh-CN" dirty="0" smtClean="0"/>
-              <a:t>. </a:t>
-            </a:r>
-            <a:r>
-              <a:rPr lang="en-US" altLang="zh-CN" dirty="0" smtClean="0"/>
-              <a:t>  </a:t>
+              <a:t>.   </a:t>
             </a:r>
             <a:r>
               <a:rPr lang="zh-CN" altLang="en-US" dirty="0" smtClean="0"/>
@@ -5287,11 +5283,7 @@
             </a:r>
             <a:r>
               <a:rPr lang="zh-CN" altLang="en-US" dirty="0" smtClean="0"/>
-              <a:t>服务</a:t>
-            </a:r>
-            <a:r>
-              <a:rPr lang="zh-CN" altLang="en-US" dirty="0" smtClean="0"/>
-              <a:t>。</a:t>
+              <a:t>服务。</a:t>
             </a:r>
             <a:endParaRPr lang="zh-CN" altLang="en-US" dirty="0"/>
           </a:p>
@@ -5345,15 +5337,7 @@
             </a:r>
             <a:r>
               <a:rPr lang="zh-CN" altLang="en-US" dirty="0" smtClean="0"/>
-              <a:t>（监听文件的变化</a:t>
-            </a:r>
-            <a:r>
-              <a:rPr lang="zh-CN" altLang="en-US" dirty="0" smtClean="0"/>
-              <a:t>，在文件被请求时，实时</a:t>
-            </a:r>
-            <a:r>
-              <a:rPr lang="zh-CN" altLang="en-US" dirty="0" smtClean="0"/>
-              <a:t>编译前端文件）</a:t>
+              <a:t>（监听文件的变化，在文件被请求时，实时编译前端文件）</a:t>
             </a:r>
             <a:endParaRPr lang="zh-CN" altLang="en-US" dirty="0"/>
           </a:p>
@@ -5387,15 +5371,7 @@
             </a:r>
             <a:r>
               <a:rPr lang="zh-CN" altLang="en-US" dirty="0" smtClean="0"/>
-              <a:t>通过脚本注入的方式，提供额外的前端</a:t>
-            </a:r>
-            <a:r>
-              <a:rPr lang="zh-CN" altLang="en-US" dirty="0" smtClean="0"/>
-              <a:t>开发支持工具</a:t>
-            </a:r>
-            <a:r>
-              <a:rPr lang="zh-CN" altLang="en-US" dirty="0" smtClean="0"/>
-              <a:t>（</a:t>
+              <a:t>通过脚本注入的方式，提供额外的前端开发支持工具（</a:t>
             </a:r>
             <a:r>
               <a:rPr lang="en-US" altLang="zh-CN" dirty="0" smtClean="0"/>
@@ -5408,6 +5384,37 @@
             <a:r>
               <a:rPr lang="en-US" altLang="zh-CN" dirty="0" smtClean="0"/>
               <a:t> </a:t>
+            </a:r>
+            <a:endParaRPr lang="zh-CN" altLang="en-US" dirty="0"/>
+          </a:p>
+        </p:txBody>
+      </p:sp>
+      <p:sp>
+        <p:nvSpPr>
+          <p:cNvPr id="2" name="矩形 1"/>
+          <p:cNvSpPr/>
+          <p:nvPr/>
+        </p:nvSpPr>
+        <p:spPr>
+          <a:xfrm>
+            <a:off x="438148" y="4083129"/>
+            <a:ext cx="4215962" cy="369332"/>
+          </a:xfrm>
+          <a:prstGeom prst="rect">
+            <a:avLst/>
+          </a:prstGeom>
+        </p:spPr>
+        <p:txBody>
+          <a:bodyPr wrap="none">
+            <a:spAutoFit/>
+          </a:bodyPr>
+          <a:lstStyle/>
+          <a:p>
+            <a:r>
+              <a:rPr lang="en-US" altLang="zh-CN" dirty="0">
+                <a:hlinkClick r:id="rId3"/>
+              </a:rPr>
+              <a:t>https://code.google.com/p/staticcompiler/</a:t>
             </a:r>
             <a:endParaRPr lang="zh-CN" altLang="en-US" dirty="0"/>
           </a:p>
@@ -6345,11 +6352,7 @@
           <a:p>
             <a:r>
               <a:rPr lang="zh-CN" altLang="en-US" sz="2400" b="1" dirty="0" smtClean="0"/>
-              <a:t>基本步骤一</a:t>
-            </a:r>
-            <a:r>
-              <a:rPr lang="zh-CN" altLang="en-US" sz="2400" b="1" dirty="0" smtClean="0"/>
-              <a:t>（</a:t>
+              <a:t>基本步骤一（</a:t>
             </a:r>
             <a:r>
               <a:rPr lang="en-US" altLang="zh-CN" sz="2400" b="1" dirty="0" smtClean="0"/>
@@ -6626,11 +6629,7 @@
             </a:r>
             <a:r>
               <a:rPr lang="zh-CN" altLang="en-US" dirty="0" smtClean="0"/>
-              <a:t>前端工程的</a:t>
-            </a:r>
-            <a:r>
-              <a:rPr lang="zh-CN" altLang="en-US" dirty="0" smtClean="0"/>
-              <a:t>配置文件</a:t>
+              <a:t>前端工程的配置文件</a:t>
             </a:r>
             <a:r>
               <a:rPr lang="en-US" altLang="zh-CN" dirty="0" smtClean="0"/>
@@ -6638,11 +6637,7 @@
             </a:r>
             <a:r>
               <a:rPr lang="zh-CN" altLang="en-US" dirty="0" smtClean="0"/>
-              <a:t>，</a:t>
-            </a:r>
-            <a:r>
-              <a:rPr lang="zh-CN" altLang="en-US" dirty="0" smtClean="0"/>
-              <a:t>合并</a:t>
+              <a:t>，合并</a:t>
             </a:r>
             <a:r>
               <a:rPr lang="en-US" altLang="zh-CN" dirty="0" smtClean="0"/>
@@ -6708,11 +6703,7 @@
             </a:r>
             <a:r>
               <a:rPr lang="zh-CN" altLang="en-US" dirty="0" smtClean="0"/>
-              <a:t>代码是</a:t>
-            </a:r>
-            <a:r>
-              <a:rPr lang="zh-CN" altLang="en-US" dirty="0" smtClean="0"/>
-              <a:t>理论上</a:t>
+              <a:t>代码是理论上</a:t>
             </a:r>
             <a:r>
               <a:rPr lang="zh-CN" altLang="en-US" dirty="0"/>
@@ -6720,15 +6711,7 @@
             </a:r>
             <a:r>
               <a:rPr lang="zh-CN" altLang="en-US" dirty="0" smtClean="0"/>
-              <a:t>是</a:t>
-            </a:r>
-            <a:r>
-              <a:rPr lang="zh-CN" altLang="en-US" dirty="0" smtClean="0"/>
-              <a:t>不允许手动修改</a:t>
-            </a:r>
-            <a:r>
-              <a:rPr lang="zh-CN" altLang="en-US" dirty="0" smtClean="0"/>
-              <a:t>的，和线上代码保持同步</a:t>
+              <a:t>是不允许手动修改的，和线上代码保持同步</a:t>
             </a:r>
             <a:endParaRPr lang="zh-CN" altLang="en-US" dirty="0"/>
           </a:p>

</xml_diff>